<commit_message>
Texte pour la présentation
</commit_message>
<xml_diff>
--- a/CDC-rapport-jdt/Presentation/Presentation_philipona.pptx
+++ b/CDC-rapport-jdt/Presentation/Presentation_philipona.pptx
@@ -9301,7 +9301,7 @@
             </a:pPr>
             <a:r>
               <a:rPr lang="fr-CH" dirty="0"/>
-              <a:t>Plus value du projet</a:t>
+              <a:t>Plus-value du projet</a:t>
             </a:r>
           </a:p>
           <a:p>
@@ -10157,13 +10157,8 @@
             </a:pPr>
             <a:r>
               <a:rPr lang="fr-CH" sz="2800" dirty="0"/>
-              <a:t>Outil de </a:t>
-            </a:r>
-            <a:r>
-              <a:rPr lang="fr-CH" sz="2800" dirty="0" err="1"/>
-              <a:t>versionning</a:t>
-            </a:r>
-            <a:endParaRPr lang="fr-CH" sz="2800" dirty="0"/>
+              <a:t>Outil de versioning</a:t>
+            </a:r>
           </a:p>
           <a:p>
             <a:pPr>
@@ -12955,20 +12950,20 @@
 </file>
 
 <file path=customXml/item1.xml><?xml version="1.0" encoding="utf-8"?>
-<p:properties xmlns:p="http://schemas.microsoft.com/office/2006/metadata/properties" xmlns:xsi="http://www.w3.org/2001/XMLSchema-instance" xmlns:pc="http://schemas.microsoft.com/office/infopath/2007/PartnerControls">
-  <documentManagement>
-    <MediaServiceKeyPoints xmlns="71af3243-3dd4-4a8d-8c0d-dd76da1f02a5" xsi:nil="true"/>
-  </documentManagement>
-</p:properties>
-</file>
-
-<file path=customXml/item2.xml><?xml version="1.0" encoding="utf-8"?>
 <?mso-contentType ?>
 <FormTemplates xmlns="http://schemas.microsoft.com/sharepoint/v3/contenttype/forms">
   <Display>DocumentLibraryForm</Display>
   <Edit>DocumentLibraryForm</Edit>
   <New>DocumentLibraryForm</New>
 </FormTemplates>
+</file>
+
+<file path=customXml/item2.xml><?xml version="1.0" encoding="utf-8"?>
+<p:properties xmlns:p="http://schemas.microsoft.com/office/2006/metadata/properties" xmlns:xsi="http://www.w3.org/2001/XMLSchema-instance" xmlns:pc="http://schemas.microsoft.com/office/infopath/2007/PartnerControls">
+  <documentManagement>
+    <MediaServiceKeyPoints xmlns="71af3243-3dd4-4a8d-8c0d-dd76da1f02a5" xsi:nil="true"/>
+  </documentManagement>
+</p:properties>
 </file>
 
 <file path=customXml/item3.xml><?xml version="1.0" encoding="utf-8"?>
@@ -13183,26 +13178,26 @@
 </file>
 
 <file path=customXml/itemProps1.xml><?xml version="1.0" encoding="utf-8"?>
-<ds:datastoreItem xmlns:ds="http://schemas.openxmlformats.org/officeDocument/2006/customXml" ds:itemID="{D7023227-530E-4024-91EF-312A851A758C}">
+<ds:datastoreItem xmlns:ds="http://schemas.openxmlformats.org/officeDocument/2006/customXml" ds:itemID="{33315AA3-EAE3-44ED-8368-BAC2FFFB4817}">
   <ds:schemaRefs>
-    <ds:schemaRef ds:uri="16c05727-aa75-4e4a-9b5f-8a80a1165891"/>
-    <ds:schemaRef ds:uri="http://schemas.microsoft.com/office/infopath/2007/PartnerControls"/>
-    <ds:schemaRef ds:uri="http://schemas.openxmlformats.org/package/2006/metadata/core-properties"/>
-    <ds:schemaRef ds:uri="http://purl.org/dc/elements/1.1/"/>
-    <ds:schemaRef ds:uri="http://purl.org/dc/dcmitype/"/>
-    <ds:schemaRef ds:uri="http://purl.org/dc/terms/"/>
-    <ds:schemaRef ds:uri="http://schemas.microsoft.com/office/2006/documentManagement/types"/>
-    <ds:schemaRef ds:uri="http://www.w3.org/XML/1998/namespace"/>
-    <ds:schemaRef ds:uri="71af3243-3dd4-4a8d-8c0d-dd76da1f02a5"/>
-    <ds:schemaRef ds:uri="http://schemas.microsoft.com/office/2006/metadata/properties"/>
+    <ds:schemaRef ds:uri="http://schemas.microsoft.com/sharepoint/v3/contenttype/forms"/>
   </ds:schemaRefs>
 </ds:datastoreItem>
 </file>
 
 <file path=customXml/itemProps2.xml><?xml version="1.0" encoding="utf-8"?>
-<ds:datastoreItem xmlns:ds="http://schemas.openxmlformats.org/officeDocument/2006/customXml" ds:itemID="{33315AA3-EAE3-44ED-8368-BAC2FFFB4817}">
+<ds:datastoreItem xmlns:ds="http://schemas.openxmlformats.org/officeDocument/2006/customXml" ds:itemID="{D7023227-530E-4024-91EF-312A851A758C}">
   <ds:schemaRefs>
-    <ds:schemaRef ds:uri="http://schemas.microsoft.com/sharepoint/v3/contenttype/forms"/>
+    <ds:schemaRef ds:uri="http://purl.org/dc/dcmitype/"/>
+    <ds:schemaRef ds:uri="http://schemas.microsoft.com/office/2006/documentManagement/types"/>
+    <ds:schemaRef ds:uri="http://www.w3.org/XML/1998/namespace"/>
+    <ds:schemaRef ds:uri="71af3243-3dd4-4a8d-8c0d-dd76da1f02a5"/>
+    <ds:schemaRef ds:uri="http://purl.org/dc/elements/1.1/"/>
+    <ds:schemaRef ds:uri="http://purl.org/dc/terms/"/>
+    <ds:schemaRef ds:uri="http://schemas.microsoft.com/office/infopath/2007/PartnerControls"/>
+    <ds:schemaRef ds:uri="http://schemas.openxmlformats.org/package/2006/metadata/core-properties"/>
+    <ds:schemaRef ds:uri="16c05727-aa75-4e4a-9b5f-8a80a1165891"/>
+    <ds:schemaRef ds:uri="http://schemas.microsoft.com/office/2006/metadata/properties"/>
   </ds:schemaRefs>
 </ds:datastoreItem>
 </file>

</xml_diff>